<commit_message>
some changes regarding reference methods
</commit_message>
<xml_diff>
--- a/slides/Java 8 - Method and Constructor References.pptx
+++ b/slides/Java 8 - Method and Constructor References.pptx
@@ -3288,7 +3288,7 @@
                   <a:srgbClr val="3095B4"/>
                 </a:solidFill>
               </a:rPr>
-              <a:t>Create</a:t>
+              <a:t>Add</a:t>
             </a:r>
             <a:r>
               <a:rPr lang="sv-SE" sz="2000" dirty="0" smtClean="0">
@@ -3304,95 +3304,7 @@
                   <a:srgbClr val="3095B4"/>
                 </a:solidFill>
               </a:rPr>
-              <a:t>Functional</a:t>
-            </a:r>
-            <a:r>
-              <a:rPr lang="sv-SE" sz="2000" dirty="0" smtClean="0">
-                <a:solidFill>
-                  <a:srgbClr val="3095B4"/>
-                </a:solidFill>
-              </a:rPr>
-              <a:t> Interface</a:t>
-            </a:r>
-          </a:p>
-          <a:p>
-            <a:pPr marL="457200" indent="-457200">
-              <a:lnSpc>
-                <a:spcPct val="100000"/>
-              </a:lnSpc>
-              <a:buAutoNum type="arabicPeriod"/>
-            </a:pPr>
-            <a:r>
-              <a:rPr lang="sv-SE" sz="2000" dirty="0" err="1" smtClean="0">
-                <a:solidFill>
-                  <a:srgbClr val="3095B4"/>
-                </a:solidFill>
-              </a:rPr>
-              <a:t>Create</a:t>
-            </a:r>
-            <a:r>
-              <a:rPr lang="sv-SE" sz="2000" dirty="0" smtClean="0">
-                <a:solidFill>
-                  <a:srgbClr val="3095B4"/>
-                </a:solidFill>
-              </a:rPr>
-              <a:t> </a:t>
-            </a:r>
-            <a:r>
-              <a:rPr lang="sv-SE" sz="2000" dirty="0" err="1" smtClean="0">
-                <a:solidFill>
-                  <a:srgbClr val="3095B4"/>
-                </a:solidFill>
-              </a:rPr>
-              <a:t>another</a:t>
-            </a:r>
-            <a:r>
-              <a:rPr lang="sv-SE" sz="2000" dirty="0" smtClean="0">
-                <a:solidFill>
-                  <a:srgbClr val="3095B4"/>
-                </a:solidFill>
-              </a:rPr>
-              <a:t> </a:t>
-            </a:r>
-            <a:r>
-              <a:rPr lang="sv-SE" sz="2000" dirty="0" err="1" smtClean="0">
-                <a:solidFill>
-                  <a:srgbClr val="3095B4"/>
-                </a:solidFill>
-              </a:rPr>
-              <a:t>class</a:t>
-            </a:r>
-            <a:r>
-              <a:rPr lang="sv-SE" sz="2000" dirty="0" smtClean="0">
-                <a:solidFill>
-                  <a:srgbClr val="3095B4"/>
-                </a:solidFill>
-              </a:rPr>
-              <a:t> </a:t>
-            </a:r>
-            <a:r>
-              <a:rPr lang="sv-SE" sz="2000" dirty="0" err="1" smtClean="0">
-                <a:solidFill>
-                  <a:srgbClr val="3095B4"/>
-                </a:solidFill>
-              </a:rPr>
-              <a:t>with</a:t>
-            </a:r>
-            <a:r>
-              <a:rPr lang="sv-SE" sz="2000" dirty="0" smtClean="0">
-                <a:solidFill>
-                  <a:srgbClr val="3095B4"/>
-                </a:solidFill>
-              </a:rPr>
-              <a:t> </a:t>
-            </a:r>
-            <a:r>
-              <a:rPr lang="sv-SE" sz="2000" dirty="0" err="1" smtClean="0">
-                <a:solidFill>
-                  <a:srgbClr val="3095B4"/>
-                </a:solidFill>
-              </a:rPr>
-              <a:t>one</a:t>
+              <a:t>godbye</a:t>
             </a:r>
             <a:r>
               <a:rPr lang="sv-SE" sz="2000" dirty="0" smtClean="0">
@@ -3410,26 +3322,13 @@
               </a:rPr>
               <a:t>method</a:t>
             </a:r>
-            <a:endParaRPr lang="sv-SE" sz="2000" dirty="0" smtClean="0">
-              <a:solidFill>
-                <a:srgbClr val="3095B4"/>
-              </a:solidFill>
-            </a:endParaRPr>
-          </a:p>
-          <a:p>
-            <a:pPr marL="457200" indent="-457200">
-              <a:lnSpc>
-                <a:spcPct val="100000"/>
-              </a:lnSpc>
-              <a:buAutoNum type="arabicPeriod"/>
-            </a:pPr>
             <a:r>
               <a:rPr lang="sv-SE" sz="2000" dirty="0" smtClean="0">
                 <a:solidFill>
                   <a:srgbClr val="3095B4"/>
                 </a:solidFill>
               </a:rPr>
-              <a:t>Make a </a:t>
+              <a:t> as </a:t>
             </a:r>
             <a:r>
               <a:rPr lang="sv-SE" sz="2000" dirty="0" err="1" smtClean="0">
@@ -3437,189 +3336,13 @@
                   <a:srgbClr val="3095B4"/>
                 </a:solidFill>
               </a:rPr>
-              <a:t>reference</a:t>
-            </a:r>
-            <a:r>
-              <a:rPr lang="sv-SE" sz="2000" dirty="0" smtClean="0">
-                <a:solidFill>
-                  <a:srgbClr val="3095B4"/>
-                </a:solidFill>
-              </a:rPr>
-              <a:t> from </a:t>
-            </a:r>
-            <a:r>
-              <a:rPr lang="sv-SE" sz="2000" dirty="0" err="1" smtClean="0">
-                <a:solidFill>
-                  <a:srgbClr val="3095B4"/>
-                </a:solidFill>
-              </a:rPr>
-              <a:t>your</a:t>
-            </a:r>
-            <a:r>
-              <a:rPr lang="sv-SE" sz="2000" dirty="0" smtClean="0">
-                <a:solidFill>
-                  <a:srgbClr val="3095B4"/>
-                </a:solidFill>
-              </a:rPr>
-              <a:t> interface </a:t>
-            </a:r>
-            <a:r>
-              <a:rPr lang="sv-SE" sz="2000" dirty="0" err="1" smtClean="0">
-                <a:solidFill>
-                  <a:srgbClr val="3095B4"/>
-                </a:solidFill>
-              </a:rPr>
-              <a:t>to</a:t>
-            </a:r>
-            <a:r>
-              <a:rPr lang="sv-SE" sz="2000" dirty="0" smtClean="0">
-                <a:solidFill>
-                  <a:srgbClr val="3095B4"/>
-                </a:solidFill>
-              </a:rPr>
-              <a:t> </a:t>
-            </a:r>
-            <a:r>
-              <a:rPr lang="sv-SE" sz="2000" dirty="0" err="1" smtClean="0">
-                <a:solidFill>
-                  <a:srgbClr val="3095B4"/>
-                </a:solidFill>
-              </a:rPr>
-              <a:t>your</a:t>
-            </a:r>
-            <a:r>
-              <a:rPr lang="sv-SE" sz="2000" dirty="0" smtClean="0">
-                <a:solidFill>
-                  <a:srgbClr val="3095B4"/>
-                </a:solidFill>
-              </a:rPr>
-              <a:t> </a:t>
-            </a:r>
-            <a:r>
-              <a:rPr lang="sv-SE" sz="2000" dirty="0" err="1" smtClean="0">
-                <a:solidFill>
-                  <a:srgbClr val="3095B4"/>
-                </a:solidFill>
-              </a:rPr>
-              <a:t>method</a:t>
+              <a:t>well</a:t>
             </a:r>
             <a:endParaRPr lang="sv-SE" sz="2000" dirty="0" smtClean="0">
               <a:solidFill>
                 <a:srgbClr val="3095B4"/>
               </a:solidFill>
             </a:endParaRPr>
-          </a:p>
-          <a:p>
-            <a:pPr marL="457200" indent="-457200">
-              <a:lnSpc>
-                <a:spcPct val="100000"/>
-              </a:lnSpc>
-              <a:buAutoNum type="arabicPeriod"/>
-            </a:pPr>
-            <a:r>
-              <a:rPr lang="sv-SE" sz="2000" dirty="0" err="1" smtClean="0">
-                <a:solidFill>
-                  <a:srgbClr val="3095B4"/>
-                </a:solidFill>
-              </a:rPr>
-              <a:t>Execute</a:t>
-            </a:r>
-            <a:r>
-              <a:rPr lang="sv-SE" sz="2000" dirty="0" smtClean="0">
-                <a:solidFill>
-                  <a:srgbClr val="3095B4"/>
-                </a:solidFill>
-              </a:rPr>
-              <a:t> </a:t>
-            </a:r>
-            <a:r>
-              <a:rPr lang="sv-SE" sz="2000" smtClean="0">
-                <a:solidFill>
-                  <a:srgbClr val="3095B4"/>
-                </a:solidFill>
-              </a:rPr>
-              <a:t>your </a:t>
-            </a:r>
-            <a:r>
-              <a:rPr lang="sv-SE" sz="2000" dirty="0" err="1" smtClean="0">
-                <a:solidFill>
-                  <a:srgbClr val="3095B4"/>
-                </a:solidFill>
-              </a:rPr>
-              <a:t>method</a:t>
-            </a:r>
-            <a:r>
-              <a:rPr lang="sv-SE" sz="2000" dirty="0" smtClean="0">
-                <a:solidFill>
-                  <a:srgbClr val="3095B4"/>
-                </a:solidFill>
-              </a:rPr>
-              <a:t> by </a:t>
-            </a:r>
-            <a:r>
-              <a:rPr lang="sv-SE" sz="2000" dirty="0" err="1" smtClean="0">
-                <a:solidFill>
-                  <a:srgbClr val="3095B4"/>
-                </a:solidFill>
-              </a:rPr>
-              <a:t>calling</a:t>
-            </a:r>
-            <a:r>
-              <a:rPr lang="sv-SE" sz="2000" dirty="0" smtClean="0">
-                <a:solidFill>
-                  <a:srgbClr val="3095B4"/>
-                </a:solidFill>
-              </a:rPr>
-              <a:t> the </a:t>
-            </a:r>
-            <a:r>
-              <a:rPr lang="sv-SE" sz="2000" dirty="0" err="1" smtClean="0">
-                <a:solidFill>
-                  <a:srgbClr val="3095B4"/>
-                </a:solidFill>
-              </a:rPr>
-              <a:t>method</a:t>
-            </a:r>
-            <a:r>
-              <a:rPr lang="sv-SE" sz="2000" dirty="0" smtClean="0">
-                <a:solidFill>
-                  <a:srgbClr val="3095B4"/>
-                </a:solidFill>
-              </a:rPr>
-              <a:t> on </a:t>
-            </a:r>
-            <a:r>
-              <a:rPr lang="sv-SE" sz="2000" dirty="0" err="1" smtClean="0">
-                <a:solidFill>
-                  <a:srgbClr val="3095B4"/>
-                </a:solidFill>
-              </a:rPr>
-              <a:t>your</a:t>
-            </a:r>
-            <a:r>
-              <a:rPr lang="sv-SE" sz="2000" dirty="0" smtClean="0">
-                <a:solidFill>
-                  <a:srgbClr val="3095B4"/>
-                </a:solidFill>
-              </a:rPr>
-              <a:t> </a:t>
-            </a:r>
-            <a:r>
-              <a:rPr lang="sv-SE" sz="2000" dirty="0" err="1" smtClean="0">
-                <a:solidFill>
-                  <a:srgbClr val="3095B4"/>
-                </a:solidFill>
-              </a:rPr>
-              <a:t>Functional</a:t>
-            </a:r>
-            <a:r>
-              <a:rPr lang="sv-SE" sz="2000" dirty="0" smtClean="0">
-                <a:solidFill>
-                  <a:srgbClr val="3095B4"/>
-                </a:solidFill>
-              </a:rPr>
-              <a:t> Interface</a:t>
-            </a:r>
           </a:p>
           <a:p>
             <a:pPr>

</xml_diff>